<commit_message>
modification de la conception
</commit_message>
<xml_diff>
--- a/conception/presentation/Presentation.pptx
+++ b/conception/presentation/Presentation.pptx
@@ -9,12 +9,11 @@
     <p:sldId id="265" r:id="rId3"/>
     <p:sldId id="264" r:id="rId4"/>
     <p:sldId id="257" r:id="rId5"/>
-    <p:sldId id="258" r:id="rId6"/>
-    <p:sldId id="259" r:id="rId7"/>
-    <p:sldId id="263" r:id="rId8"/>
-    <p:sldId id="260" r:id="rId9"/>
-    <p:sldId id="261" r:id="rId10"/>
-    <p:sldId id="262" r:id="rId11"/>
+    <p:sldId id="266" r:id="rId6"/>
+    <p:sldId id="267" r:id="rId7"/>
+    <p:sldId id="268" r:id="rId8"/>
+    <p:sldId id="269" r:id="rId9"/>
+    <p:sldId id="270" r:id="rId10"/>
   </p:sldIdLst>
   <p:sldSz cx="12192000" cy="6858000"/>
   <p:notesSz cx="6858000" cy="9144000"/>
@@ -113,6 +112,11 @@
       </a:defRPr>
     </a:lvl9pPr>
   </p:defaultTextStyle>
+  <p:extLst>
+    <p:ext uri="{EFAFB233-063F-42B5-8137-9DF3F51BA10A}">
+      <p15:sldGuideLst xmlns:p15="http://schemas.microsoft.com/office/powerpoint/2012/main"/>
+    </p:ext>
+  </p:extLst>
 </p:presentation>
 </file>
 
@@ -3321,98 +3325,6 @@
 </p:sld>
 </file>
 
-<file path=ppt/slides/slide10.xml><?xml version="1.0" encoding="utf-8"?>
-<p:sld xmlns:a="http://schemas.openxmlformats.org/drawingml/2006/main" xmlns:r="http://schemas.openxmlformats.org/officeDocument/2006/relationships" xmlns:p="http://schemas.openxmlformats.org/presentationml/2006/main">
-  <p:cSld>
-    <p:spTree>
-      <p:nvGrpSpPr>
-        <p:cNvPr id="1" name=""/>
-        <p:cNvGrpSpPr/>
-        <p:nvPr/>
-      </p:nvGrpSpPr>
-      <p:grpSpPr>
-        <a:xfrm>
-          <a:off x="0" y="0"/>
-          <a:ext cx="0" cy="0"/>
-          <a:chOff x="0" y="0"/>
-          <a:chExt cx="0" cy="0"/>
-        </a:xfrm>
-      </p:grpSpPr>
-      <p:sp>
-        <p:nvSpPr>
-          <p:cNvPr id="2" name="Title 1">
-            <a:extLst>
-              <a:ext uri="{FF2B5EF4-FFF2-40B4-BE49-F238E27FC236}">
-                <a16:creationId xmlns:a16="http://schemas.microsoft.com/office/drawing/2014/main" id="{A68DFCE5-D5AA-DB4B-BFF4-A6AB27AFF1C2}"/>
-              </a:ext>
-            </a:extLst>
-          </p:cNvPr>
-          <p:cNvSpPr>
-            <a:spLocks noGrp="1"/>
-          </p:cNvSpPr>
-          <p:nvPr>
-            <p:ph type="title"/>
-          </p:nvPr>
-        </p:nvSpPr>
-        <p:spPr>
-          <a:xfrm>
-            <a:off x="2036826" y="57875"/>
-            <a:ext cx="7729728" cy="1188720"/>
-          </a:xfrm>
-        </p:spPr>
-        <p:txBody>
-          <a:bodyPr/>
-          <a:lstStyle/>
-          <a:p>
-            <a:r>
-              <a:rPr lang="fr-FR" dirty="0"/>
-              <a:t>TRANSCIPTION SQL</a:t>
-            </a:r>
-          </a:p>
-        </p:txBody>
-      </p:sp>
-      <p:pic>
-        <p:nvPicPr>
-          <p:cNvPr id="5" name="Content Placeholder 4">
-            <a:extLst>
-              <a:ext uri="{FF2B5EF4-FFF2-40B4-BE49-F238E27FC236}">
-                <a16:creationId xmlns:a16="http://schemas.microsoft.com/office/drawing/2014/main" id="{587C40D1-08EF-3140-B61F-457EFC06527B}"/>
-              </a:ext>
-            </a:extLst>
-          </p:cNvPr>
-          <p:cNvPicPr>
-            <a:picLocks noGrp="1" noChangeAspect="1"/>
-          </p:cNvPicPr>
-          <p:nvPr>
-            <p:ph idx="1"/>
-          </p:nvPr>
-        </p:nvPicPr>
-        <p:blipFill>
-          <a:blip r:embed="rId2"/>
-          <a:stretch>
-            <a:fillRect/>
-          </a:stretch>
-        </p:blipFill>
-        <p:spPr>
-          <a:xfrm>
-            <a:off x="0" y="1657350"/>
-            <a:ext cx="12192000" cy="5200651"/>
-          </a:xfrm>
-        </p:spPr>
-      </p:pic>
-    </p:spTree>
-    <p:extLst>
-      <p:ext uri="{BB962C8B-B14F-4D97-AF65-F5344CB8AC3E}">
-        <p14:creationId xmlns:p14="http://schemas.microsoft.com/office/powerpoint/2010/main" val="752002535"/>
-      </p:ext>
-    </p:extLst>
-  </p:cSld>
-  <p:clrMapOvr>
-    <a:masterClrMapping/>
-  </p:clrMapOvr>
-</p:sld>
-</file>
-
 <file path=ppt/slides/slide2.xml><?xml version="1.0" encoding="utf-8"?>
 <p:sld xmlns:a="http://schemas.openxmlformats.org/drawingml/2006/main" xmlns:r="http://schemas.openxmlformats.org/officeDocument/2006/relationships" xmlns:p="http://schemas.openxmlformats.org/presentationml/2006/main">
   <p:cSld>
@@ -3509,7 +3421,7 @@
           <a:p>
             <a:r>
               <a:rPr lang="fr-FR" dirty="0"/>
-              <a:t>- Caprice</a:t>
+              <a:t>- 	Caprice</a:t>
             </a:r>
           </a:p>
         </p:txBody>
@@ -3733,7 +3645,7 @@
           <p:cNvPr id="2" name="Title 1">
             <a:extLst>
               <a:ext uri="{FF2B5EF4-FFF2-40B4-BE49-F238E27FC236}">
-                <a16:creationId xmlns:a16="http://schemas.microsoft.com/office/drawing/2014/main" id="{3AA8B68C-4D27-EC46-ABDF-B9970AED1BAB}"/>
+                <a16:creationId xmlns:a16="http://schemas.microsoft.com/office/drawing/2014/main" id="{86490BF1-B63B-7E45-941B-C9DD6BA8053B}"/>
               </a:ext>
             </a:extLst>
           </p:cNvPr>
@@ -3744,19 +3656,14 @@
             <p:ph type="title"/>
           </p:nvPr>
         </p:nvSpPr>
-        <p:spPr>
-          <a:xfrm>
-            <a:off x="2231136" y="217169"/>
-            <a:ext cx="7729728" cy="1188720"/>
-          </a:xfrm>
-        </p:spPr>
+        <p:spPr/>
         <p:txBody>
           <a:bodyPr/>
           <a:lstStyle/>
           <a:p>
             <a:r>
               <a:rPr lang="fr-FR" dirty="0"/>
-              <a:t>OBJECT ET DIAGRAMME DE CLASSE </a:t>
+              <a:t>Détermination des objets</a:t>
             </a:r>
           </a:p>
         </p:txBody>
@@ -3766,7 +3673,7 @@
           <p:cNvPr id="5" name="Content Placeholder 4">
             <a:extLst>
               <a:ext uri="{FF2B5EF4-FFF2-40B4-BE49-F238E27FC236}">
-                <a16:creationId xmlns:a16="http://schemas.microsoft.com/office/drawing/2014/main" id="{DE0646A4-1EDB-0E47-B3C6-4573923A28E6}"/>
+                <a16:creationId xmlns:a16="http://schemas.microsoft.com/office/drawing/2014/main" id="{0CC6E7C7-0838-9743-8D64-CEE5334604AF}"/>
               </a:ext>
             </a:extLst>
           </p:cNvPr>
@@ -3785,15 +3692,15 @@
         </p:blipFill>
         <p:spPr>
           <a:xfrm>
-            <a:off x="2034541" y="2146671"/>
-            <a:ext cx="7646670" cy="4320540"/>
+            <a:off x="2927443" y="2638425"/>
+            <a:ext cx="6337115" cy="3101975"/>
           </a:xfrm>
         </p:spPr>
       </p:pic>
     </p:spTree>
     <p:extLst>
       <p:ext uri="{BB962C8B-B14F-4D97-AF65-F5344CB8AC3E}">
-        <p14:creationId xmlns:p14="http://schemas.microsoft.com/office/powerpoint/2010/main" val="4243272890"/>
+        <p14:creationId xmlns:p14="http://schemas.microsoft.com/office/powerpoint/2010/main" val="52420283"/>
       </p:ext>
     </p:extLst>
   </p:cSld>
@@ -3825,7 +3732,7 @@
           <p:cNvPr id="2" name="Title 1">
             <a:extLst>
               <a:ext uri="{FF2B5EF4-FFF2-40B4-BE49-F238E27FC236}">
-                <a16:creationId xmlns:a16="http://schemas.microsoft.com/office/drawing/2014/main" id="{9F2EA574-9C7C-AF4F-AE11-5A85D71C8A14}"/>
+                <a16:creationId xmlns:a16="http://schemas.microsoft.com/office/drawing/2014/main" id="{D5DA2DA2-12E1-0B4B-9682-3BF2AD26ED79}"/>
               </a:ext>
             </a:extLst>
           </p:cNvPr>
@@ -3836,56 +3743,106 @@
             <p:ph type="title"/>
           </p:nvPr>
         </p:nvSpPr>
-        <p:spPr>
-          <a:xfrm>
-            <a:off x="2036826" y="0"/>
-            <a:ext cx="7729728" cy="1188720"/>
-          </a:xfrm>
-        </p:spPr>
-        <p:txBody>
-          <a:bodyPr/>
-          <a:lstStyle/>
-          <a:p>
-            <a:r>
-              <a:rPr lang="fr-FR" dirty="0"/>
-              <a:t>MODELE CONCEPTUEL DES DONNEES</a:t>
-            </a:r>
-          </a:p>
-        </p:txBody>
-      </p:sp>
-      <p:pic>
-        <p:nvPicPr>
-          <p:cNvPr id="5" name="Content Placeholder 4">
+        <p:spPr/>
+        <p:txBody>
+          <a:bodyPr/>
+          <a:lstStyle/>
+          <a:p>
+            <a:endParaRPr lang="fr-FR"/>
+          </a:p>
+        </p:txBody>
+      </p:sp>
+      <p:sp>
+        <p:nvSpPr>
+          <p:cNvPr id="3" name="Content Placeholder 2">
             <a:extLst>
               <a:ext uri="{FF2B5EF4-FFF2-40B4-BE49-F238E27FC236}">
-                <a16:creationId xmlns:a16="http://schemas.microsoft.com/office/drawing/2014/main" id="{8C96ED00-80EF-7846-A3AB-93979335FEE3}"/>
+                <a16:creationId xmlns:a16="http://schemas.microsoft.com/office/drawing/2014/main" id="{11294F42-0770-7D4E-8762-4E1E0F59D5B0}"/>
               </a:ext>
             </a:extLst>
           </p:cNvPr>
-          <p:cNvPicPr>
-            <a:picLocks noGrp="1" noChangeAspect="1"/>
-          </p:cNvPicPr>
+          <p:cNvSpPr>
+            <a:spLocks noGrp="1"/>
+          </p:cNvSpPr>
           <p:nvPr>
             <p:ph idx="1"/>
           </p:nvPr>
-        </p:nvPicPr>
-        <p:blipFill>
-          <a:blip r:embed="rId2"/>
-          <a:stretch>
-            <a:fillRect/>
-          </a:stretch>
-        </p:blipFill>
-        <p:spPr>
-          <a:xfrm>
-            <a:off x="194310" y="1394460"/>
-            <a:ext cx="11997690" cy="5463539"/>
-          </a:xfrm>
-        </p:spPr>
-      </p:pic>
+        </p:nvSpPr>
+        <p:spPr/>
+        <p:txBody>
+          <a:bodyPr>
+            <a:normAutofit fontScale="85000" lnSpcReduction="20000"/>
+          </a:bodyPr>
+          <a:lstStyle/>
+          <a:p>
+            <a:r>
+              <a:rPr lang="fr-FR" dirty="0"/>
+              <a:t>-	un utilisateur participe à un événement</a:t>
+            </a:r>
+          </a:p>
+          <a:p>
+            <a:r>
+              <a:rPr lang="fr-FR" dirty="0"/>
+              <a:t>-	un utilisateur gère un événement</a:t>
+            </a:r>
+          </a:p>
+          <a:p>
+            <a:r>
+              <a:rPr lang="fr-FR" dirty="0"/>
+              <a:t>-	un utilisateur publie une annonce</a:t>
+            </a:r>
+          </a:p>
+          <a:p>
+            <a:r>
+              <a:rPr lang="fr-FR" dirty="0"/>
+              <a:t>-	un utilisateur émet des commentaires</a:t>
+            </a:r>
+          </a:p>
+          <a:p>
+            <a:r>
+              <a:rPr lang="fr-FR" dirty="0"/>
+              <a:t>-	un utilisateur peut créer un calendrier</a:t>
+            </a:r>
+          </a:p>
+          <a:p>
+            <a:r>
+              <a:rPr lang="fr-FR" dirty="0"/>
+              <a:t>-	un commentaire concerne un événement</a:t>
+            </a:r>
+          </a:p>
+          <a:p>
+            <a:r>
+              <a:rPr lang="fr-FR" dirty="0"/>
+              <a:t>-	un événement est planifié dans calendrier</a:t>
+            </a:r>
+          </a:p>
+          <a:p>
+            <a:r>
+              <a:rPr lang="fr-FR" dirty="0"/>
+              <a:t>-	une annonce est faite pour un événement</a:t>
+            </a:r>
+          </a:p>
+          <a:p>
+            <a:r>
+              <a:rPr lang="fr-FR" dirty="0"/>
+              <a:t>-	un utilisateur peut rédiger une notification</a:t>
+            </a:r>
+          </a:p>
+          <a:p>
+            <a:r>
+              <a:rPr lang="fr-FR" dirty="0"/>
+              <a:t>-	une notification fait référence à un événement</a:t>
+            </a:r>
+          </a:p>
+          <a:p>
+            <a:endParaRPr lang="fr-FR" dirty="0"/>
+          </a:p>
+        </p:txBody>
+      </p:sp>
     </p:spTree>
     <p:extLst>
       <p:ext uri="{BB962C8B-B14F-4D97-AF65-F5344CB8AC3E}">
-        <p14:creationId xmlns:p14="http://schemas.microsoft.com/office/powerpoint/2010/main" val="266490789"/>
+        <p14:creationId xmlns:p14="http://schemas.microsoft.com/office/powerpoint/2010/main" val="25530045"/>
       </p:ext>
     </p:extLst>
   </p:cSld>
@@ -3917,7 +3874,7 @@
           <p:cNvPr id="2" name="Title 1">
             <a:extLst>
               <a:ext uri="{FF2B5EF4-FFF2-40B4-BE49-F238E27FC236}">
-                <a16:creationId xmlns:a16="http://schemas.microsoft.com/office/drawing/2014/main" id="{4E486150-7D99-5246-9092-E93C2E733967}"/>
+                <a16:creationId xmlns:a16="http://schemas.microsoft.com/office/drawing/2014/main" id="{F71E15BA-9FD1-BE46-8115-7C1BFF65ECD0}"/>
               </a:ext>
             </a:extLst>
           </p:cNvPr>
@@ -3928,19 +3885,14 @@
             <p:ph type="title"/>
           </p:nvPr>
         </p:nvSpPr>
-        <p:spPr>
-          <a:xfrm>
-            <a:off x="2231136" y="281786"/>
-            <a:ext cx="7729728" cy="1188720"/>
-          </a:xfrm>
-        </p:spPr>
+        <p:spPr/>
         <p:txBody>
           <a:bodyPr/>
           <a:lstStyle/>
           <a:p>
             <a:r>
               <a:rPr lang="fr-FR" dirty="0"/>
-              <a:t>DIAGRAME DE CLASSE AVEC RELATION</a:t>
+              <a:t>MODELE CONCEPTUEL DES DONNEES</a:t>
             </a:r>
           </a:p>
         </p:txBody>
@@ -3950,7 +3902,7 @@
           <p:cNvPr id="5" name="Content Placeholder 4">
             <a:extLst>
               <a:ext uri="{FF2B5EF4-FFF2-40B4-BE49-F238E27FC236}">
-                <a16:creationId xmlns:a16="http://schemas.microsoft.com/office/drawing/2014/main" id="{2AD3A8F2-4E23-8343-9F56-A38DA4061ABA}"/>
+                <a16:creationId xmlns:a16="http://schemas.microsoft.com/office/drawing/2014/main" id="{797B54F2-595C-194B-8F9D-DB6C9C375479}"/>
               </a:ext>
             </a:extLst>
           </p:cNvPr>
@@ -3962,28 +3914,22 @@
           </p:nvPr>
         </p:nvPicPr>
         <p:blipFill>
-          <a:blip r:embed="rId2">
-            <a:extLst>
-              <a:ext uri="{96DAC541-7B7A-43D3-8B79-37D633B846F1}">
-                <asvg:svgBlip xmlns:asvg="http://schemas.microsoft.com/office/drawing/2016/SVG/main" r:embed="rId3"/>
-              </a:ext>
-            </a:extLst>
-          </a:blip>
+          <a:blip r:embed="rId2"/>
           <a:stretch>
             <a:fillRect/>
           </a:stretch>
         </p:blipFill>
         <p:spPr>
           <a:xfrm>
-            <a:off x="472966" y="2448910"/>
-            <a:ext cx="10226566" cy="4162097"/>
+            <a:off x="3834922" y="2638425"/>
+            <a:ext cx="4522156" cy="3101975"/>
           </a:xfrm>
         </p:spPr>
       </p:pic>
     </p:spTree>
     <p:extLst>
       <p:ext uri="{BB962C8B-B14F-4D97-AF65-F5344CB8AC3E}">
-        <p14:creationId xmlns:p14="http://schemas.microsoft.com/office/powerpoint/2010/main" val="4119399514"/>
+        <p14:creationId xmlns:p14="http://schemas.microsoft.com/office/powerpoint/2010/main" val="1051359540"/>
       </p:ext>
     </p:extLst>
   </p:cSld>
@@ -4015,7 +3961,7 @@
           <p:cNvPr id="2" name="Title 1">
             <a:extLst>
               <a:ext uri="{FF2B5EF4-FFF2-40B4-BE49-F238E27FC236}">
-                <a16:creationId xmlns:a16="http://schemas.microsoft.com/office/drawing/2014/main" id="{A1F2DF46-A10A-3844-83D4-FA489680B3B2}"/>
+                <a16:creationId xmlns:a16="http://schemas.microsoft.com/office/drawing/2014/main" id="{99DAFD96-A927-D249-B075-53A8E7C7B3E8}"/>
               </a:ext>
             </a:extLst>
           </p:cNvPr>
@@ -4026,19 +3972,14 @@
             <p:ph type="title"/>
           </p:nvPr>
         </p:nvSpPr>
-        <p:spPr>
-          <a:xfrm>
-            <a:off x="2151126" y="0"/>
-            <a:ext cx="7729728" cy="1188720"/>
-          </a:xfrm>
-        </p:spPr>
+        <p:spPr/>
         <p:txBody>
           <a:bodyPr/>
           <a:lstStyle/>
           <a:p>
             <a:r>
               <a:rPr lang="fr-FR" dirty="0"/>
-              <a:t>MODELE PHYSIQUE DES DONNES</a:t>
+              <a:t>MODEL PHYSIQUE DES DONNEES</a:t>
             </a:r>
           </a:p>
         </p:txBody>
@@ -4048,7 +3989,7 @@
           <p:cNvPr id="5" name="Content Placeholder 4">
             <a:extLst>
               <a:ext uri="{FF2B5EF4-FFF2-40B4-BE49-F238E27FC236}">
-                <a16:creationId xmlns:a16="http://schemas.microsoft.com/office/drawing/2014/main" id="{403258CD-6A0C-6F45-8A70-4A6C8EE9892D}"/>
+                <a16:creationId xmlns:a16="http://schemas.microsoft.com/office/drawing/2014/main" id="{18B913C3-54C3-6045-B017-9710E3E4B9DB}"/>
               </a:ext>
             </a:extLst>
           </p:cNvPr>
@@ -4067,15 +4008,15 @@
         </p:blipFill>
         <p:spPr>
           <a:xfrm>
-            <a:off x="0" y="1323854"/>
-            <a:ext cx="12192000" cy="5372101"/>
+            <a:off x="3967901" y="2638425"/>
+            <a:ext cx="4256198" cy="3101975"/>
           </a:xfrm>
         </p:spPr>
       </p:pic>
     </p:spTree>
     <p:extLst>
       <p:ext uri="{BB962C8B-B14F-4D97-AF65-F5344CB8AC3E}">
-        <p14:creationId xmlns:p14="http://schemas.microsoft.com/office/powerpoint/2010/main" val="3395605586"/>
+        <p14:creationId xmlns:p14="http://schemas.microsoft.com/office/powerpoint/2010/main" val="1850693521"/>
       </p:ext>
     </p:extLst>
   </p:cSld>
@@ -4107,7 +4048,7 @@
           <p:cNvPr id="2" name="Title 1">
             <a:extLst>
               <a:ext uri="{FF2B5EF4-FFF2-40B4-BE49-F238E27FC236}">
-                <a16:creationId xmlns:a16="http://schemas.microsoft.com/office/drawing/2014/main" id="{0ACA3207-B005-C345-B281-43DCF0A8CA12}"/>
+                <a16:creationId xmlns:a16="http://schemas.microsoft.com/office/drawing/2014/main" id="{B56CEA0A-458F-D24F-B519-06A124F4FBB1}"/>
               </a:ext>
             </a:extLst>
           </p:cNvPr>
@@ -4120,7 +4061,7 @@
         </p:nvSpPr>
         <p:spPr>
           <a:xfrm>
-            <a:off x="2082546" y="92166"/>
+            <a:off x="2231136" y="197707"/>
             <a:ext cx="7729728" cy="1188720"/>
           </a:xfrm>
         </p:spPr>
@@ -4130,7 +4071,7 @@
           <a:p>
             <a:r>
               <a:rPr lang="fr-FR" dirty="0"/>
-              <a:t>MODELE LOGIQUE DES DONNEES</a:t>
+              <a:t>DIAGRAMME DE CLASSE</a:t>
             </a:r>
           </a:p>
         </p:txBody>
@@ -4140,7 +4081,7 @@
           <p:cNvPr id="5" name="Content Placeholder 4">
             <a:extLst>
               <a:ext uri="{FF2B5EF4-FFF2-40B4-BE49-F238E27FC236}">
-                <a16:creationId xmlns:a16="http://schemas.microsoft.com/office/drawing/2014/main" id="{A4F55D67-3A30-8B49-A69B-324248FC18A8}"/>
+                <a16:creationId xmlns:a16="http://schemas.microsoft.com/office/drawing/2014/main" id="{D48F51CF-F980-5541-A817-3747CE7D956A}"/>
               </a:ext>
             </a:extLst>
           </p:cNvPr>
@@ -4159,15 +4100,15 @@
         </p:blipFill>
         <p:spPr>
           <a:xfrm>
-            <a:off x="445770" y="2153412"/>
-            <a:ext cx="11746230" cy="3527297"/>
+            <a:off x="593124" y="2153413"/>
+            <a:ext cx="10144898" cy="4506880"/>
           </a:xfrm>
         </p:spPr>
       </p:pic>
     </p:spTree>
     <p:extLst>
       <p:ext uri="{BB962C8B-B14F-4D97-AF65-F5344CB8AC3E}">
-        <p14:creationId xmlns:p14="http://schemas.microsoft.com/office/powerpoint/2010/main" val="980366152"/>
+        <p14:creationId xmlns:p14="http://schemas.microsoft.com/office/powerpoint/2010/main" val="1722852946"/>
       </p:ext>
     </p:extLst>
   </p:cSld>

</xml_diff>

<commit_message>
ajout du dictionnaire de donnees
</commit_message>
<xml_diff>
--- a/conception/presentation/Presentation.pptx
+++ b/conception/presentation/Presentation.pptx
@@ -8,7 +8,7 @@
     <p:sldId id="256" r:id="rId2"/>
     <p:sldId id="265" r:id="rId3"/>
     <p:sldId id="264" r:id="rId4"/>
-    <p:sldId id="257" r:id="rId5"/>
+    <p:sldId id="271" r:id="rId5"/>
     <p:sldId id="266" r:id="rId6"/>
     <p:sldId id="267" r:id="rId7"/>
     <p:sldId id="268" r:id="rId8"/>
@@ -3553,7 +3553,7 @@
           <p:cNvPr id="2" name="Title 1">
             <a:extLst>
               <a:ext uri="{FF2B5EF4-FFF2-40B4-BE49-F238E27FC236}">
-                <a16:creationId xmlns:a16="http://schemas.microsoft.com/office/drawing/2014/main" id="{C9FC6262-1FDF-5D43-98D4-F551E0C8A348}"/>
+                <a16:creationId xmlns:a16="http://schemas.microsoft.com/office/drawing/2014/main" id="{ED932D51-58E0-BD42-B19E-4CF73BA496AA}"/>
               </a:ext>
             </a:extLst>
           </p:cNvPr>
@@ -3566,7 +3566,7 @@
         </p:nvSpPr>
         <p:spPr>
           <a:xfrm>
-            <a:off x="2139696" y="54610"/>
+            <a:off x="2095212" y="87362"/>
             <a:ext cx="7729728" cy="1188720"/>
           </a:xfrm>
         </p:spPr>
@@ -3576,8 +3576,13 @@
           <a:p>
             <a:r>
               <a:rPr lang="fr-FR" dirty="0"/>
-              <a:t>DICTIONNAIRE DES DONNEES</a:t>
-            </a:r>
+              <a:t>Dictionnaire des </a:t>
+            </a:r>
+            <a:r>
+              <a:rPr lang="fr-FR" dirty="0" err="1"/>
+              <a:t>donnees</a:t>
+            </a:r>
+            <a:endParaRPr lang="fr-FR" dirty="0"/>
           </a:p>
         </p:txBody>
       </p:sp>
@@ -3586,7 +3591,7 @@
           <p:cNvPr id="5" name="Content Placeholder 4">
             <a:extLst>
               <a:ext uri="{FF2B5EF4-FFF2-40B4-BE49-F238E27FC236}">
-                <a16:creationId xmlns:a16="http://schemas.microsoft.com/office/drawing/2014/main" id="{86013242-5A7D-CE40-827C-DD6897DB541C}"/>
+                <a16:creationId xmlns:a16="http://schemas.microsoft.com/office/drawing/2014/main" id="{0570617F-34C0-9C40-857F-FA2BEB23AF34}"/>
               </a:ext>
             </a:extLst>
           </p:cNvPr>
@@ -3605,15 +3610,15 @@
         </p:blipFill>
         <p:spPr>
           <a:xfrm>
-            <a:off x="2240280" y="1359080"/>
-            <a:ext cx="7829550" cy="5466079"/>
+            <a:off x="593124" y="1383957"/>
+            <a:ext cx="10861590" cy="5214551"/>
           </a:xfrm>
         </p:spPr>
       </p:pic>
     </p:spTree>
     <p:extLst>
       <p:ext uri="{BB962C8B-B14F-4D97-AF65-F5344CB8AC3E}">
-        <p14:creationId xmlns:p14="http://schemas.microsoft.com/office/powerpoint/2010/main" val="4156204199"/>
+        <p14:creationId xmlns:p14="http://schemas.microsoft.com/office/powerpoint/2010/main" val="2427316760"/>
       </p:ext>
     </p:extLst>
   </p:cSld>

</xml_diff>

<commit_message>
mise à jour presentation
</commit_message>
<xml_diff>
--- a/conception/presentation/Presentation.pptx
+++ b/conception/presentation/Presentation.pptx
@@ -279,7 +279,8 @@
           <a:p>
             <a:fld id="{1160EA64-D806-43AC-9DF2-F8C432F32B4C}" type="datetimeFigureOut">
               <a:rPr lang="en-US" dirty="0"/>
-              <a:t>3/20/24</a:t>
+              <a:pPr/>
+              <a:t>3/21/2024</a:t>
             </a:fld>
             <a:endParaRPr lang="en-US" dirty="0"/>
           </a:p>
@@ -322,7 +323,7 @@
             <a:fld id="{8A7A6979-0714-4377-B894-6BE4C2D6E202}" type="slidenum">
               <a:rPr lang="en-US" dirty="0"/>
               <a:pPr/>
-              <a:t>‹#›</a:t>
+              <a:t>‹N°›</a:t>
             </a:fld>
             <a:endParaRPr lang="en-US" dirty="0"/>
           </a:p>
@@ -445,7 +446,8 @@
           <a:p>
             <a:fld id="{E9F9C37B-1D36-470B-8223-D6C91242EC14}" type="datetimeFigureOut">
               <a:rPr lang="en-US" dirty="0"/>
-              <a:t>3/20/24</a:t>
+              <a:pPr/>
+              <a:t>3/21/2024</a:t>
             </a:fld>
             <a:endParaRPr lang="en-US" dirty="0"/>
           </a:p>
@@ -487,7 +489,8 @@
           <a:p>
             <a:fld id="{8A7A6979-0714-4377-B894-6BE4C2D6E202}" type="slidenum">
               <a:rPr lang="en-US" dirty="0"/>
-              <a:t>‹#›</a:t>
+              <a:pPr/>
+              <a:t>‹N°›</a:t>
             </a:fld>
             <a:endParaRPr lang="en-US" dirty="0"/>
           </a:p>
@@ -620,7 +623,8 @@
           <a:p>
             <a:fld id="{67C6F52A-A82B-47A2-A83A-8C4C91F2D59F}" type="datetimeFigureOut">
               <a:rPr lang="en-US" dirty="0"/>
-              <a:t>3/20/24</a:t>
+              <a:pPr/>
+              <a:t>3/21/2024</a:t>
             </a:fld>
             <a:endParaRPr lang="en-US" dirty="0"/>
           </a:p>
@@ -662,7 +666,8 @@
           <a:p>
             <a:fld id="{8A7A6979-0714-4377-B894-6BE4C2D6E202}" type="slidenum">
               <a:rPr lang="en-US" dirty="0"/>
-              <a:t>‹#›</a:t>
+              <a:pPr/>
+              <a:t>‹N°›</a:t>
             </a:fld>
             <a:endParaRPr lang="en-US" dirty="0"/>
           </a:p>
@@ -785,7 +790,8 @@
           <a:p>
             <a:fld id="{F070A7B3-6521-4DCA-87E5-044747A908C1}" type="datetimeFigureOut">
               <a:rPr lang="en-US" dirty="0"/>
-              <a:t>3/20/24</a:t>
+              <a:pPr/>
+              <a:t>3/21/2024</a:t>
             </a:fld>
             <a:endParaRPr lang="en-US" dirty="0"/>
           </a:p>
@@ -828,7 +834,7 @@
             <a:fld id="{8A7A6979-0714-4377-B894-6BE4C2D6E202}" type="slidenum">
               <a:rPr lang="en-US" dirty="0"/>
               <a:pPr/>
-              <a:t>‹#›</a:t>
+              <a:t>‹N°›</a:t>
             </a:fld>
             <a:endParaRPr lang="en-US" dirty="0"/>
           </a:p>
@@ -1049,7 +1055,8 @@
           <a:p>
             <a:fld id="{1160EA64-D806-43AC-9DF2-F8C432F32B4C}" type="datetimeFigureOut">
               <a:rPr lang="en-US" dirty="0"/>
-              <a:t>3/20/24</a:t>
+              <a:pPr/>
+              <a:t>3/21/2024</a:t>
             </a:fld>
             <a:endParaRPr lang="en-US" dirty="0"/>
           </a:p>
@@ -1092,7 +1099,7 @@
             <a:fld id="{8A7A6979-0714-4377-B894-6BE4C2D6E202}" type="slidenum">
               <a:rPr lang="en-US" dirty="0"/>
               <a:pPr/>
-              <a:t>‹#›</a:t>
+              <a:t>‹N°›</a:t>
             </a:fld>
             <a:endParaRPr lang="en-US" dirty="0"/>
           </a:p>
@@ -1277,7 +1284,8 @@
           <a:p>
             <a:fld id="{AB134690-1557-4C89-A502-4959FE7FAD70}" type="datetimeFigureOut">
               <a:rPr lang="en-US" dirty="0"/>
-              <a:t>3/20/24</a:t>
+              <a:pPr/>
+              <a:t>3/21/2024</a:t>
             </a:fld>
             <a:endParaRPr lang="en-US" dirty="0"/>
           </a:p>
@@ -1319,7 +1327,8 @@
           <a:p>
             <a:fld id="{8A7A6979-0714-4377-B894-6BE4C2D6E202}" type="slidenum">
               <a:rPr lang="en-US" dirty="0"/>
-              <a:t>‹#›</a:t>
+              <a:pPr/>
+              <a:t>‹N°›</a:t>
             </a:fld>
             <a:endParaRPr lang="en-US" dirty="0"/>
           </a:p>
@@ -1631,7 +1640,8 @@
           <a:p>
             <a:fld id="{4F7D4976-E339-4826-83B7-FBD03F55ECF8}" type="datetimeFigureOut">
               <a:rPr lang="en-US" dirty="0"/>
-              <a:t>3/20/24</a:t>
+              <a:pPr/>
+              <a:t>3/21/2024</a:t>
             </a:fld>
             <a:endParaRPr lang="en-US" dirty="0"/>
           </a:p>
@@ -1673,7 +1683,8 @@
           <a:p>
             <a:fld id="{8A7A6979-0714-4377-B894-6BE4C2D6E202}" type="slidenum">
               <a:rPr lang="en-US" dirty="0"/>
-              <a:t>‹#›</a:t>
+              <a:pPr/>
+              <a:t>‹N°›</a:t>
             </a:fld>
             <a:endParaRPr lang="en-US" dirty="0"/>
           </a:p>
@@ -1767,7 +1778,8 @@
           <a:p>
             <a:fld id="{E1037C31-9E7A-4F99-8774-A0E530DE1A42}" type="datetimeFigureOut">
               <a:rPr lang="en-US" dirty="0"/>
-              <a:t>3/20/24</a:t>
+              <a:pPr/>
+              <a:t>3/21/2024</a:t>
             </a:fld>
             <a:endParaRPr lang="en-US" dirty="0"/>
           </a:p>
@@ -1809,7 +1821,8 @@
           <a:p>
             <a:fld id="{8A7A6979-0714-4377-B894-6BE4C2D6E202}" type="slidenum">
               <a:rPr lang="en-US" dirty="0"/>
-              <a:t>‹#›</a:t>
+              <a:pPr/>
+              <a:t>‹N°›</a:t>
             </a:fld>
             <a:endParaRPr lang="en-US" dirty="0"/>
           </a:p>
@@ -1857,7 +1870,8 @@
           <a:p>
             <a:fld id="{C278504F-A551-4DE0-9316-4DCD1D8CC752}" type="datetimeFigureOut">
               <a:rPr lang="en-US" dirty="0"/>
-              <a:t>3/20/24</a:t>
+              <a:pPr/>
+              <a:t>3/21/2024</a:t>
             </a:fld>
             <a:endParaRPr lang="en-US" dirty="0"/>
           </a:p>
@@ -1899,7 +1913,8 @@
           <a:p>
             <a:fld id="{8A7A6979-0714-4377-B894-6BE4C2D6E202}" type="slidenum">
               <a:rPr lang="en-US" dirty="0"/>
-              <a:t>‹#›</a:t>
+              <a:pPr/>
+              <a:t>‹N°›</a:t>
             </a:fld>
             <a:endParaRPr lang="en-US" dirty="0"/>
           </a:p>
@@ -2209,7 +2224,8 @@
           <a:p>
             <a:fld id="{D1BE4249-C0D0-4B06-8692-E8BB871AF643}" type="datetimeFigureOut">
               <a:rPr lang="en-US" dirty="0"/>
-              <a:t>3/20/24</a:t>
+              <a:pPr/>
+              <a:t>3/21/2024</a:t>
             </a:fld>
             <a:endParaRPr lang="en-US" dirty="0"/>
           </a:p>
@@ -2266,7 +2282,8 @@
           <a:p>
             <a:fld id="{8A7A6979-0714-4377-B894-6BE4C2D6E202}" type="slidenum">
               <a:rPr lang="en-US" dirty="0"/>
-              <a:t>‹#›</a:t>
+              <a:pPr/>
+              <a:t>‹N°›</a:t>
             </a:fld>
             <a:endParaRPr lang="en-US" dirty="0"/>
           </a:p>
@@ -2561,7 +2578,8 @@
           <a:p>
             <a:fld id="{042B0DB6-F5C7-45FB-8CF3-31B45F9C2DAC}" type="datetimeFigureOut">
               <a:rPr lang="en-US" dirty="0"/>
-              <a:t>3/20/24</a:t>
+              <a:pPr/>
+              <a:t>3/21/2024</a:t>
             </a:fld>
             <a:endParaRPr lang="en-US" dirty="0"/>
           </a:p>
@@ -2618,7 +2636,8 @@
           <a:p>
             <a:fld id="{8A7A6979-0714-4377-B894-6BE4C2D6E202}" type="slidenum">
               <a:rPr lang="en-US" dirty="0"/>
-              <a:t>‹#›</a:t>
+              <a:pPr/>
+              <a:t>‹N°›</a:t>
             </a:fld>
             <a:endParaRPr lang="en-US" dirty="0"/>
           </a:p>
@@ -2798,7 +2817,8 @@
           <a:p>
             <a:fld id="{1160EA64-D806-43AC-9DF2-F8C432F32B4C}" type="datetimeFigureOut">
               <a:rPr lang="en-US" dirty="0"/>
-              <a:t>3/20/24</a:t>
+              <a:pPr/>
+              <a:t>3/21/2024</a:t>
             </a:fld>
             <a:endParaRPr lang="en-US" dirty="0"/>
           </a:p>
@@ -2882,7 +2902,7 @@
             <a:fld id="{8A7A6979-0714-4377-B894-6BE4C2D6E202}" type="slidenum">
               <a:rPr lang="en-US" dirty="0"/>
               <a:pPr/>
-              <a:t>‹#›</a:t>
+              <a:t>‹N°›</a:t>
             </a:fld>
             <a:endParaRPr lang="en-US" dirty="0"/>
           </a:p>
@@ -3252,7 +3272,7 @@
           <p:cNvPr id="2" name="Title 1">
             <a:extLst>
               <a:ext uri="{FF2B5EF4-FFF2-40B4-BE49-F238E27FC236}">
-                <a16:creationId xmlns:a16="http://schemas.microsoft.com/office/drawing/2014/main" id="{00A839E6-E2EC-FD43-9FEF-AB790772D9D3}"/>
+                <a16:creationId xmlns:a16="http://schemas.microsoft.com/office/drawing/2014/main" xmlns="" id="{00A839E6-E2EC-FD43-9FEF-AB790772D9D3}"/>
               </a:ext>
             </a:extLst>
           </p:cNvPr>
@@ -3280,7 +3300,7 @@
           <p:cNvPr id="3" name="Subtitle 2">
             <a:extLst>
               <a:ext uri="{FF2B5EF4-FFF2-40B4-BE49-F238E27FC236}">
-                <a16:creationId xmlns:a16="http://schemas.microsoft.com/office/drawing/2014/main" id="{F59E5260-A9D2-4C49-9B79-F7D511B31EBB}"/>
+                <a16:creationId xmlns:a16="http://schemas.microsoft.com/office/drawing/2014/main" xmlns="" id="{F59E5260-A9D2-4C49-9B79-F7D511B31EBB}"/>
               </a:ext>
             </a:extLst>
           </p:cNvPr>
@@ -3311,7 +3331,7 @@
     </p:spTree>
     <p:extLst>
       <p:ext uri="{BB962C8B-B14F-4D97-AF65-F5344CB8AC3E}">
-        <p14:creationId xmlns:p14="http://schemas.microsoft.com/office/powerpoint/2010/main" val="906894890"/>
+        <p14:creationId xmlns:p14="http://schemas.microsoft.com/office/powerpoint/2010/main" xmlns="" val="906894890"/>
       </p:ext>
     </p:extLst>
   </p:cSld>
@@ -3343,7 +3363,7 @@
           <p:cNvPr id="2" name="Title 1">
             <a:extLst>
               <a:ext uri="{FF2B5EF4-FFF2-40B4-BE49-F238E27FC236}">
-                <a16:creationId xmlns:a16="http://schemas.microsoft.com/office/drawing/2014/main" id="{A68DFCE5-D5AA-DB4B-BFF4-A6AB27AFF1C2}"/>
+                <a16:creationId xmlns:a16="http://schemas.microsoft.com/office/drawing/2014/main" xmlns="" id="{A68DFCE5-D5AA-DB4B-BFF4-A6AB27AFF1C2}"/>
               </a:ext>
             </a:extLst>
           </p:cNvPr>
@@ -3376,7 +3396,7 @@
           <p:cNvPr id="5" name="Content Placeholder 4">
             <a:extLst>
               <a:ext uri="{FF2B5EF4-FFF2-40B4-BE49-F238E27FC236}">
-                <a16:creationId xmlns:a16="http://schemas.microsoft.com/office/drawing/2014/main" id="{587C40D1-08EF-3140-B61F-457EFC06527B}"/>
+                <a16:creationId xmlns:a16="http://schemas.microsoft.com/office/drawing/2014/main" xmlns="" id="{587C40D1-08EF-3140-B61F-457EFC06527B}"/>
               </a:ext>
             </a:extLst>
           </p:cNvPr>
@@ -3403,7 +3423,7 @@
     </p:spTree>
     <p:extLst>
       <p:ext uri="{BB962C8B-B14F-4D97-AF65-F5344CB8AC3E}">
-        <p14:creationId xmlns:p14="http://schemas.microsoft.com/office/powerpoint/2010/main" val="752002535"/>
+        <p14:creationId xmlns:p14="http://schemas.microsoft.com/office/powerpoint/2010/main" xmlns="" val="752002535"/>
       </p:ext>
     </p:extLst>
   </p:cSld>
@@ -3435,7 +3455,7 @@
           <p:cNvPr id="2" name="Title 1">
             <a:extLst>
               <a:ext uri="{FF2B5EF4-FFF2-40B4-BE49-F238E27FC236}">
-                <a16:creationId xmlns:a16="http://schemas.microsoft.com/office/drawing/2014/main" id="{9D96E17F-1028-D148-B189-83F9A4C1FE73}"/>
+                <a16:creationId xmlns:a16="http://schemas.microsoft.com/office/drawing/2014/main" xmlns="" id="{9D96E17F-1028-D148-B189-83F9A4C1FE73}"/>
               </a:ext>
             </a:extLst>
           </p:cNvPr>
@@ -3463,7 +3483,7 @@
           <p:cNvPr id="3" name="Content Placeholder 2">
             <a:extLst>
               <a:ext uri="{FF2B5EF4-FFF2-40B4-BE49-F238E27FC236}">
-                <a16:creationId xmlns:a16="http://schemas.microsoft.com/office/drawing/2014/main" id="{D3FD2D07-15CF-9040-A7E1-69E533E8A54C}"/>
+                <a16:creationId xmlns:a16="http://schemas.microsoft.com/office/drawing/2014/main" xmlns="" id="{D3FD2D07-15CF-9040-A7E1-69E533E8A54C}"/>
               </a:ext>
             </a:extLst>
           </p:cNvPr>
@@ -3517,7 +3537,7 @@
     </p:spTree>
     <p:extLst>
       <p:ext uri="{BB962C8B-B14F-4D97-AF65-F5344CB8AC3E}">
-        <p14:creationId xmlns:p14="http://schemas.microsoft.com/office/powerpoint/2010/main" val="4199062536"/>
+        <p14:creationId xmlns:p14="http://schemas.microsoft.com/office/powerpoint/2010/main" xmlns="" val="4199062536"/>
       </p:ext>
     </p:extLst>
   </p:cSld>
@@ -3549,7 +3569,7 @@
           <p:cNvPr id="2" name="Title 1">
             <a:extLst>
               <a:ext uri="{FF2B5EF4-FFF2-40B4-BE49-F238E27FC236}">
-                <a16:creationId xmlns:a16="http://schemas.microsoft.com/office/drawing/2014/main" id="{04780F8B-A673-5E46-B69D-90970069CAED}"/>
+                <a16:creationId xmlns:a16="http://schemas.microsoft.com/office/drawing/2014/main" xmlns="" id="{04780F8B-A673-5E46-B69D-90970069CAED}"/>
               </a:ext>
             </a:extLst>
           </p:cNvPr>
@@ -3582,7 +3602,7 @@
           <p:cNvPr id="5" name="Content Placeholder 4">
             <a:extLst>
               <a:ext uri="{FF2B5EF4-FFF2-40B4-BE49-F238E27FC236}">
-                <a16:creationId xmlns:a16="http://schemas.microsoft.com/office/drawing/2014/main" id="{C5BF60A7-1156-054E-B914-DC41B3F8E5BF}"/>
+                <a16:creationId xmlns:a16="http://schemas.microsoft.com/office/drawing/2014/main" xmlns="" id="{C5BF60A7-1156-054E-B914-DC41B3F8E5BF}"/>
               </a:ext>
             </a:extLst>
           </p:cNvPr>
@@ -3609,7 +3629,7 @@
     </p:spTree>
     <p:extLst>
       <p:ext uri="{BB962C8B-B14F-4D97-AF65-F5344CB8AC3E}">
-        <p14:creationId xmlns:p14="http://schemas.microsoft.com/office/powerpoint/2010/main" val="1414785773"/>
+        <p14:creationId xmlns:p14="http://schemas.microsoft.com/office/powerpoint/2010/main" xmlns="" val="1414785773"/>
       </p:ext>
     </p:extLst>
   </p:cSld>
@@ -3641,7 +3661,7 @@
           <p:cNvPr id="2" name="Title 1">
             <a:extLst>
               <a:ext uri="{FF2B5EF4-FFF2-40B4-BE49-F238E27FC236}">
-                <a16:creationId xmlns:a16="http://schemas.microsoft.com/office/drawing/2014/main" id="{C9FC6262-1FDF-5D43-98D4-F551E0C8A348}"/>
+                <a16:creationId xmlns:a16="http://schemas.microsoft.com/office/drawing/2014/main" xmlns="" id="{C9FC6262-1FDF-5D43-98D4-F551E0C8A348}"/>
               </a:ext>
             </a:extLst>
           </p:cNvPr>
@@ -3655,7 +3675,7 @@
         <p:spPr>
           <a:xfrm>
             <a:off x="2139696" y="54610"/>
-            <a:ext cx="7729728" cy="1188720"/>
+            <a:ext cx="7729728" cy="939303"/>
           </a:xfrm>
         </p:spPr>
         <p:txBody>
@@ -3671,13 +3691,7 @@
       </p:sp>
       <p:pic>
         <p:nvPicPr>
-          <p:cNvPr id="5" name="Content Placeholder 4">
-            <a:extLst>
-              <a:ext uri="{FF2B5EF4-FFF2-40B4-BE49-F238E27FC236}">
-                <a16:creationId xmlns:a16="http://schemas.microsoft.com/office/drawing/2014/main" id="{86013242-5A7D-CE40-827C-DD6897DB541C}"/>
-              </a:ext>
-            </a:extLst>
-          </p:cNvPr>
+          <p:cNvPr id="6" name="Espace réservé du contenu 5" descr="WhatsApp Image 2024-03-21 à 03.59.31_9648614f.jpg"/>
           <p:cNvPicPr>
             <a:picLocks noGrp="1" noChangeAspect="1"/>
           </p:cNvPicPr>
@@ -3693,15 +3707,15 @@
         </p:blipFill>
         <p:spPr>
           <a:xfrm>
-            <a:off x="2240280" y="1359080"/>
-            <a:ext cx="7829550" cy="5466079"/>
+            <a:off x="662609" y="1152939"/>
+            <a:ext cx="9409043" cy="5459896"/>
           </a:xfrm>
         </p:spPr>
       </p:pic>
     </p:spTree>
     <p:extLst>
       <p:ext uri="{BB962C8B-B14F-4D97-AF65-F5344CB8AC3E}">
-        <p14:creationId xmlns:p14="http://schemas.microsoft.com/office/powerpoint/2010/main" val="4156204199"/>
+        <p14:creationId xmlns:p14="http://schemas.microsoft.com/office/powerpoint/2010/main" xmlns="" val="4156204199"/>
       </p:ext>
     </p:extLst>
   </p:cSld>
@@ -3733,7 +3747,7 @@
           <p:cNvPr id="2" name="Title 1">
             <a:extLst>
               <a:ext uri="{FF2B5EF4-FFF2-40B4-BE49-F238E27FC236}">
-                <a16:creationId xmlns:a16="http://schemas.microsoft.com/office/drawing/2014/main" id="{3AA8B68C-4D27-EC46-ABDF-B9970AED1BAB}"/>
+                <a16:creationId xmlns:a16="http://schemas.microsoft.com/office/drawing/2014/main" xmlns="" id="{3AA8B68C-4D27-EC46-ABDF-B9970AED1BAB}"/>
               </a:ext>
             </a:extLst>
           </p:cNvPr>
@@ -3766,7 +3780,7 @@
           <p:cNvPr id="5" name="Content Placeholder 4">
             <a:extLst>
               <a:ext uri="{FF2B5EF4-FFF2-40B4-BE49-F238E27FC236}">
-                <a16:creationId xmlns:a16="http://schemas.microsoft.com/office/drawing/2014/main" id="{DE0646A4-1EDB-0E47-B3C6-4573923A28E6}"/>
+                <a16:creationId xmlns:a16="http://schemas.microsoft.com/office/drawing/2014/main" xmlns="" id="{DE0646A4-1EDB-0E47-B3C6-4573923A28E6}"/>
               </a:ext>
             </a:extLst>
           </p:cNvPr>
@@ -3793,7 +3807,7 @@
     </p:spTree>
     <p:extLst>
       <p:ext uri="{BB962C8B-B14F-4D97-AF65-F5344CB8AC3E}">
-        <p14:creationId xmlns:p14="http://schemas.microsoft.com/office/powerpoint/2010/main" val="4243272890"/>
+        <p14:creationId xmlns:p14="http://schemas.microsoft.com/office/powerpoint/2010/main" xmlns="" val="4243272890"/>
       </p:ext>
     </p:extLst>
   </p:cSld>
@@ -3825,7 +3839,7 @@
           <p:cNvPr id="2" name="Title 1">
             <a:extLst>
               <a:ext uri="{FF2B5EF4-FFF2-40B4-BE49-F238E27FC236}">
-                <a16:creationId xmlns:a16="http://schemas.microsoft.com/office/drawing/2014/main" id="{9F2EA574-9C7C-AF4F-AE11-5A85D71C8A14}"/>
+                <a16:creationId xmlns:a16="http://schemas.microsoft.com/office/drawing/2014/main" xmlns="" id="{9F2EA574-9C7C-AF4F-AE11-5A85D71C8A14}"/>
               </a:ext>
             </a:extLst>
           </p:cNvPr>
@@ -3858,7 +3872,7 @@
           <p:cNvPr id="5" name="Content Placeholder 4">
             <a:extLst>
               <a:ext uri="{FF2B5EF4-FFF2-40B4-BE49-F238E27FC236}">
-                <a16:creationId xmlns:a16="http://schemas.microsoft.com/office/drawing/2014/main" id="{8C96ED00-80EF-7846-A3AB-93979335FEE3}"/>
+                <a16:creationId xmlns:a16="http://schemas.microsoft.com/office/drawing/2014/main" xmlns="" id="{8C96ED00-80EF-7846-A3AB-93979335FEE3}"/>
               </a:ext>
             </a:extLst>
           </p:cNvPr>
@@ -3885,7 +3899,7 @@
     </p:spTree>
     <p:extLst>
       <p:ext uri="{BB962C8B-B14F-4D97-AF65-F5344CB8AC3E}">
-        <p14:creationId xmlns:p14="http://schemas.microsoft.com/office/powerpoint/2010/main" val="266490789"/>
+        <p14:creationId xmlns:p14="http://schemas.microsoft.com/office/powerpoint/2010/main" xmlns="" val="266490789"/>
       </p:ext>
     </p:extLst>
   </p:cSld>
@@ -3917,7 +3931,7 @@
           <p:cNvPr id="2" name="Title 1">
             <a:extLst>
               <a:ext uri="{FF2B5EF4-FFF2-40B4-BE49-F238E27FC236}">
-                <a16:creationId xmlns:a16="http://schemas.microsoft.com/office/drawing/2014/main" id="{4E486150-7D99-5246-9092-E93C2E733967}"/>
+                <a16:creationId xmlns:a16="http://schemas.microsoft.com/office/drawing/2014/main" xmlns="" id="{4E486150-7D99-5246-9092-E93C2E733967}"/>
               </a:ext>
             </a:extLst>
           </p:cNvPr>
@@ -3950,7 +3964,7 @@
           <p:cNvPr id="5" name="Content Placeholder 4">
             <a:extLst>
               <a:ext uri="{FF2B5EF4-FFF2-40B4-BE49-F238E27FC236}">
-                <a16:creationId xmlns:a16="http://schemas.microsoft.com/office/drawing/2014/main" id="{2AD3A8F2-4E23-8343-9F56-A38DA4061ABA}"/>
+                <a16:creationId xmlns:a16="http://schemas.microsoft.com/office/drawing/2014/main" xmlns="" id="{2AD3A8F2-4E23-8343-9F56-A38DA4061ABA}"/>
               </a:ext>
             </a:extLst>
           </p:cNvPr>
@@ -3965,7 +3979,7 @@
           <a:blip r:embed="rId2">
             <a:extLst>
               <a:ext uri="{96DAC541-7B7A-43D3-8B79-37D633B846F1}">
-                <asvg:svgBlip xmlns:asvg="http://schemas.microsoft.com/office/drawing/2016/SVG/main" r:embed="rId3"/>
+                <asvg:svgBlip xmlns:asvg="http://schemas.microsoft.com/office/drawing/2016/SVG/main" xmlns="" r:embed="rId3"/>
               </a:ext>
             </a:extLst>
           </a:blip>
@@ -3983,7 +3997,7 @@
     </p:spTree>
     <p:extLst>
       <p:ext uri="{BB962C8B-B14F-4D97-AF65-F5344CB8AC3E}">
-        <p14:creationId xmlns:p14="http://schemas.microsoft.com/office/powerpoint/2010/main" val="4119399514"/>
+        <p14:creationId xmlns:p14="http://schemas.microsoft.com/office/powerpoint/2010/main" xmlns="" val="4119399514"/>
       </p:ext>
     </p:extLst>
   </p:cSld>
@@ -4015,7 +4029,7 @@
           <p:cNvPr id="2" name="Title 1">
             <a:extLst>
               <a:ext uri="{FF2B5EF4-FFF2-40B4-BE49-F238E27FC236}">
-                <a16:creationId xmlns:a16="http://schemas.microsoft.com/office/drawing/2014/main" id="{A1F2DF46-A10A-3844-83D4-FA489680B3B2}"/>
+                <a16:creationId xmlns:a16="http://schemas.microsoft.com/office/drawing/2014/main" xmlns="" id="{A1F2DF46-A10A-3844-83D4-FA489680B3B2}"/>
               </a:ext>
             </a:extLst>
           </p:cNvPr>
@@ -4048,7 +4062,7 @@
           <p:cNvPr id="5" name="Content Placeholder 4">
             <a:extLst>
               <a:ext uri="{FF2B5EF4-FFF2-40B4-BE49-F238E27FC236}">
-                <a16:creationId xmlns:a16="http://schemas.microsoft.com/office/drawing/2014/main" id="{403258CD-6A0C-6F45-8A70-4A6C8EE9892D}"/>
+                <a16:creationId xmlns:a16="http://schemas.microsoft.com/office/drawing/2014/main" xmlns="" id="{403258CD-6A0C-6F45-8A70-4A6C8EE9892D}"/>
               </a:ext>
             </a:extLst>
           </p:cNvPr>
@@ -4075,7 +4089,7 @@
     </p:spTree>
     <p:extLst>
       <p:ext uri="{BB962C8B-B14F-4D97-AF65-F5344CB8AC3E}">
-        <p14:creationId xmlns:p14="http://schemas.microsoft.com/office/powerpoint/2010/main" val="3395605586"/>
+        <p14:creationId xmlns:p14="http://schemas.microsoft.com/office/powerpoint/2010/main" xmlns="" val="3395605586"/>
       </p:ext>
     </p:extLst>
   </p:cSld>
@@ -4107,7 +4121,7 @@
           <p:cNvPr id="2" name="Title 1">
             <a:extLst>
               <a:ext uri="{FF2B5EF4-FFF2-40B4-BE49-F238E27FC236}">
-                <a16:creationId xmlns:a16="http://schemas.microsoft.com/office/drawing/2014/main" id="{0ACA3207-B005-C345-B281-43DCF0A8CA12}"/>
+                <a16:creationId xmlns:a16="http://schemas.microsoft.com/office/drawing/2014/main" xmlns="" id="{0ACA3207-B005-C345-B281-43DCF0A8CA12}"/>
               </a:ext>
             </a:extLst>
           </p:cNvPr>
@@ -4140,7 +4154,7 @@
           <p:cNvPr id="5" name="Content Placeholder 4">
             <a:extLst>
               <a:ext uri="{FF2B5EF4-FFF2-40B4-BE49-F238E27FC236}">
-                <a16:creationId xmlns:a16="http://schemas.microsoft.com/office/drawing/2014/main" id="{A4F55D67-3A30-8B49-A69B-324248FC18A8}"/>
+                <a16:creationId xmlns:a16="http://schemas.microsoft.com/office/drawing/2014/main" xmlns="" id="{A4F55D67-3A30-8B49-A69B-324248FC18A8}"/>
               </a:ext>
             </a:extLst>
           </p:cNvPr>
@@ -4167,7 +4181,7 @@
     </p:spTree>
     <p:extLst>
       <p:ext uri="{BB962C8B-B14F-4D97-AF65-F5344CB8AC3E}">
-        <p14:creationId xmlns:p14="http://schemas.microsoft.com/office/powerpoint/2010/main" val="980366152"/>
+        <p14:creationId xmlns:p14="http://schemas.microsoft.com/office/powerpoint/2010/main" xmlns="" val="980366152"/>
       </p:ext>
     </p:extLst>
   </p:cSld>
@@ -4220,7 +4234,7 @@
     </a:clrScheme>
     <a:fontScheme name="Parcel">
       <a:majorFont>
-        <a:latin typeface="Gill Sans MT" panose="020B0502020104020203"/>
+        <a:latin typeface="Gill Sans MT"/>
         <a:ea typeface=""/>
         <a:cs typeface=""/>
         <a:font script="Grek" typeface="Corbel"/>
@@ -4257,7 +4271,7 @@
         <a:font script="Geor" typeface="Sylfaen"/>
       </a:majorFont>
       <a:minorFont>
-        <a:latin typeface="Gill Sans MT" panose="020B0502020104020203"/>
+        <a:latin typeface="Gill Sans MT"/>
         <a:ea typeface=""/>
         <a:cs typeface=""/>
         <a:font script="Grek" typeface="Corbel"/>
@@ -4431,7 +4445,7 @@
   <a:extraClrSchemeLst/>
   <a:extLst>
     <a:ext uri="{05A4C25C-085E-4340-85A3-A5531E510DB2}">
-      <thm15:themeFamily xmlns:thm15="http://schemas.microsoft.com/office/thememl/2012/main" name="Parcel" id="{8BEC4385-4EB9-4D53-BFB5-0EA123736B6D}" vid="{4DB32801-28C0-48B0-8C1D-A9A58613615A}"/>
+      <thm15:themeFamily xmlns:thm15="http://schemas.microsoft.com/office/thememl/2012/main" xmlns="" name="Parcel" id="{8BEC4385-4EB9-4D53-BFB5-0EA123736B6D}" vid="{4DB32801-28C0-48B0-8C1D-A9A58613615A}"/>
     </a:ext>
   </a:extLst>
 </a:theme>

</xml_diff>